<commit_message>
TW edits for diagram and list items
</commit_message>
<xml_diff>
--- a/docs/deployment_guide/images/nvidia-cloudxr-architecture-diagram.pptx
+++ b/docs/deployment_guide/images/nvidia-cloudxr-architecture-diagram.pptx
@@ -104,6 +104,11 @@
       </a:defRPr>
     </a:lvl9pPr>
   </p:defaultTextStyle>
+  <p:extLst>
+    <p:ext uri="{EFAFB233-063F-42B5-8137-9DF3F51BA10A}">
+      <p15:sldGuideLst xmlns:p15="http://schemas.microsoft.com/office/powerpoint/2012/main"/>
+    </p:ext>
+  </p:extLst>
 </p:presentation>
 </file>
 
@@ -254,7 +259,7 @@
           <a:p>
             <a:fld id="{57FDE35A-8C5E-412B-9F88-2F523D6285FF}" type="datetimeFigureOut">
               <a:rPr lang="en-US" smtClean="0"/>
-              <a:t>12/2/2022</a:t>
+              <a:t>1/30/2023</a:t>
             </a:fld>
             <a:endParaRPr lang="en-US"/>
           </a:p>
@@ -452,7 +457,7 @@
           <a:p>
             <a:fld id="{57FDE35A-8C5E-412B-9F88-2F523D6285FF}" type="datetimeFigureOut">
               <a:rPr lang="en-US" smtClean="0"/>
-              <a:t>12/2/2022</a:t>
+              <a:t>1/30/2023</a:t>
             </a:fld>
             <a:endParaRPr lang="en-US"/>
           </a:p>
@@ -660,7 +665,7 @@
           <a:p>
             <a:fld id="{57FDE35A-8C5E-412B-9F88-2F523D6285FF}" type="datetimeFigureOut">
               <a:rPr lang="en-US" smtClean="0"/>
-              <a:t>12/2/2022</a:t>
+              <a:t>1/30/2023</a:t>
             </a:fld>
             <a:endParaRPr lang="en-US"/>
           </a:p>
@@ -858,7 +863,7 @@
           <a:p>
             <a:fld id="{57FDE35A-8C5E-412B-9F88-2F523D6285FF}" type="datetimeFigureOut">
               <a:rPr lang="en-US" smtClean="0"/>
-              <a:t>12/2/2022</a:t>
+              <a:t>1/30/2023</a:t>
             </a:fld>
             <a:endParaRPr lang="en-US"/>
           </a:p>
@@ -1133,7 +1138,7 @@
           <a:p>
             <a:fld id="{57FDE35A-8C5E-412B-9F88-2F523D6285FF}" type="datetimeFigureOut">
               <a:rPr lang="en-US" smtClean="0"/>
-              <a:t>12/2/2022</a:t>
+              <a:t>1/30/2023</a:t>
             </a:fld>
             <a:endParaRPr lang="en-US"/>
           </a:p>
@@ -1398,7 +1403,7 @@
           <a:p>
             <a:fld id="{57FDE35A-8C5E-412B-9F88-2F523D6285FF}" type="datetimeFigureOut">
               <a:rPr lang="en-US" smtClean="0"/>
-              <a:t>12/2/2022</a:t>
+              <a:t>1/30/2023</a:t>
             </a:fld>
             <a:endParaRPr lang="en-US"/>
           </a:p>
@@ -1810,7 +1815,7 @@
           <a:p>
             <a:fld id="{57FDE35A-8C5E-412B-9F88-2F523D6285FF}" type="datetimeFigureOut">
               <a:rPr lang="en-US" smtClean="0"/>
-              <a:t>12/2/2022</a:t>
+              <a:t>1/30/2023</a:t>
             </a:fld>
             <a:endParaRPr lang="en-US"/>
           </a:p>
@@ -1951,7 +1956,7 @@
           <a:p>
             <a:fld id="{57FDE35A-8C5E-412B-9F88-2F523D6285FF}" type="datetimeFigureOut">
               <a:rPr lang="en-US" smtClean="0"/>
-              <a:t>12/2/2022</a:t>
+              <a:t>1/30/2023</a:t>
             </a:fld>
             <a:endParaRPr lang="en-US"/>
           </a:p>
@@ -2064,7 +2069,7 @@
           <a:p>
             <a:fld id="{57FDE35A-8C5E-412B-9F88-2F523D6285FF}" type="datetimeFigureOut">
               <a:rPr lang="en-US" smtClean="0"/>
-              <a:t>12/2/2022</a:t>
+              <a:t>1/30/2023</a:t>
             </a:fld>
             <a:endParaRPr lang="en-US"/>
           </a:p>
@@ -2375,7 +2380,7 @@
           <a:p>
             <a:fld id="{57FDE35A-8C5E-412B-9F88-2F523D6285FF}" type="datetimeFigureOut">
               <a:rPr lang="en-US" smtClean="0"/>
-              <a:t>12/2/2022</a:t>
+              <a:t>1/30/2023</a:t>
             </a:fld>
             <a:endParaRPr lang="en-US"/>
           </a:p>
@@ -2663,7 +2668,7 @@
           <a:p>
             <a:fld id="{57FDE35A-8C5E-412B-9F88-2F523D6285FF}" type="datetimeFigureOut">
               <a:rPr lang="en-US" smtClean="0"/>
-              <a:t>12/2/2022</a:t>
+              <a:t>1/30/2023</a:t>
             </a:fld>
             <a:endParaRPr lang="en-US"/>
           </a:p>
@@ -2904,7 +2909,7 @@
           <a:p>
             <a:fld id="{57FDE35A-8C5E-412B-9F88-2F523D6285FF}" type="datetimeFigureOut">
               <a:rPr lang="en-US" smtClean="0"/>
-              <a:t>12/2/2022</a:t>
+              <a:t>1/30/2023</a:t>
             </a:fld>
             <a:endParaRPr lang="en-US"/>
           </a:p>
@@ -3335,8 +3340,8 @@
         </p:nvSpPr>
         <p:spPr>
           <a:xfrm>
-            <a:off x="2133600" y="76200"/>
-            <a:ext cx="9677400" cy="6400800"/>
+            <a:off x="1280160" y="365760"/>
+            <a:ext cx="9966960" cy="5212080"/>
           </a:xfrm>
           <a:prstGeom prst="rect">
             <a:avLst/>
@@ -3419,8 +3424,8 @@
         </p:blipFill>
         <p:spPr bwMode="auto">
           <a:xfrm>
-            <a:off x="2120900" y="152400"/>
-            <a:ext cx="330200" cy="330200"/>
+            <a:off x="1280160" y="365760"/>
+            <a:ext cx="384048" cy="384048"/>
           </a:xfrm>
           <a:prstGeom prst="rect">
             <a:avLst/>
@@ -3464,8 +3469,8 @@
         </p:nvSpPr>
         <p:spPr>
           <a:xfrm>
-            <a:off x="2590800" y="1219200"/>
-            <a:ext cx="2590800" cy="4953000"/>
+            <a:off x="2743200" y="1280160"/>
+            <a:ext cx="2194560" cy="3840480"/>
           </a:xfrm>
           <a:prstGeom prst="rect">
             <a:avLst/>
@@ -3517,7 +3522,7 @@
                 <a:latin typeface="Arial" panose="020B0604020202020204" pitchFamily="34" charset="0"/>
                 <a:cs typeface="Arial" panose="020B0604020202020204" pitchFamily="34" charset="0"/>
               </a:rPr>
-              <a:t>Public subnet</a:t>
+              <a:t>   Public subnet</a:t>
             </a:r>
           </a:p>
         </p:txBody>
@@ -3551,8 +3556,8 @@
         </p:blipFill>
         <p:spPr bwMode="auto">
           <a:xfrm>
-            <a:off x="2590800" y="1249362"/>
-            <a:ext cx="274638" cy="274638"/>
+            <a:off x="2743200" y="1280160"/>
+            <a:ext cx="384048" cy="384048"/>
           </a:xfrm>
           <a:prstGeom prst="rect">
             <a:avLst/>
@@ -3596,8 +3601,8 @@
         </p:nvSpPr>
         <p:spPr>
           <a:xfrm>
-            <a:off x="5715000" y="1219200"/>
-            <a:ext cx="2590800" cy="4954588"/>
+            <a:off x="5532120" y="1280160"/>
+            <a:ext cx="2194560" cy="3840480"/>
           </a:xfrm>
           <a:prstGeom prst="rect">
             <a:avLst/>
@@ -3649,7 +3654,7 @@
                 <a:latin typeface="Arial" panose="020B0604020202020204" pitchFamily="34" charset="0"/>
                 <a:cs typeface="Arial" panose="020B0604020202020204" pitchFamily="34" charset="0"/>
               </a:rPr>
-              <a:t>Public subnet</a:t>
+              <a:t>   Public subnet</a:t>
             </a:r>
           </a:p>
         </p:txBody>
@@ -3683,8 +3688,8 @@
         </p:blipFill>
         <p:spPr bwMode="auto">
           <a:xfrm>
-            <a:off x="5715000" y="1249362"/>
-            <a:ext cx="274638" cy="274638"/>
+            <a:off x="5532120" y="1280160"/>
+            <a:ext cx="384048" cy="384048"/>
           </a:xfrm>
           <a:prstGeom prst="rect">
             <a:avLst/>
@@ -3728,8 +3733,8 @@
         </p:nvSpPr>
         <p:spPr>
           <a:xfrm>
-            <a:off x="8839200" y="1219200"/>
-            <a:ext cx="2590800" cy="4954588"/>
+            <a:off x="8229600" y="1280160"/>
+            <a:ext cx="2194560" cy="3840480"/>
           </a:xfrm>
           <a:prstGeom prst="rect">
             <a:avLst/>
@@ -3781,7 +3786,7 @@
                 <a:latin typeface="Arial" panose="020B0604020202020204" pitchFamily="34" charset="0"/>
                 <a:cs typeface="Arial" panose="020B0604020202020204" pitchFamily="34" charset="0"/>
               </a:rPr>
-              <a:t>Public subnet</a:t>
+              <a:t>   Public subnet</a:t>
             </a:r>
           </a:p>
         </p:txBody>
@@ -3815,8 +3820,8 @@
         </p:blipFill>
         <p:spPr bwMode="auto">
           <a:xfrm>
-            <a:off x="8839200" y="1249362"/>
-            <a:ext cx="274638" cy="274638"/>
+            <a:off x="8229600" y="1280160"/>
+            <a:ext cx="384048" cy="384048"/>
           </a:xfrm>
           <a:prstGeom prst="rect">
             <a:avLst/>
@@ -3860,8 +3865,8 @@
         </p:nvSpPr>
         <p:spPr>
           <a:xfrm>
-            <a:off x="2501900" y="4343400"/>
-            <a:ext cx="9080500" cy="1676400"/>
+            <a:off x="2468880" y="3200400"/>
+            <a:ext cx="8321040" cy="1737360"/>
           </a:xfrm>
           <a:prstGeom prst="rect">
             <a:avLst/>
@@ -3940,15 +3945,26 @@
               <a:defRPr/>
             </a:pPr>
             <a:r>
-              <a:rPr lang="en-US" sz="1200">
+              <a:rPr lang="en-US" sz="1200" dirty="0">
                 <a:solidFill>
                   <a:srgbClr val="D86613"/>
                 </a:solidFill>
                 <a:latin typeface="Arial" panose="020B0604020202020204" pitchFamily="34" charset="0"/>
                 <a:cs typeface="Arial" panose="020B0604020202020204" pitchFamily="34" charset="0"/>
               </a:rPr>
-              <a:t>Collaboration and Clustering Auto </a:t>
-            </a:r>
+              <a:t>Auto Scaling group </a:t>
+            </a:r>
+          </a:p>
+          <a:p>
+            <a:pPr algn="ctr" eaLnBrk="1" fontAlgn="auto" hangingPunct="1">
+              <a:spcBef>
+                <a:spcPts val="0"/>
+              </a:spcBef>
+              <a:spcAft>
+                <a:spcPts val="0"/>
+              </a:spcAft>
+              <a:defRPr/>
+            </a:pPr>
             <a:r>
               <a:rPr lang="en-US" sz="1200" dirty="0">
                 <a:solidFill>
@@ -3957,7 +3973,7 @@
                 <a:latin typeface="Arial" panose="020B0604020202020204" pitchFamily="34" charset="0"/>
                 <a:cs typeface="Arial" panose="020B0604020202020204" pitchFamily="34" charset="0"/>
               </a:rPr>
-              <a:t>Scaling group</a:t>
+              <a:t>(collaboration and clustering) </a:t>
             </a:r>
           </a:p>
         </p:txBody>
@@ -3991,8 +4007,8 @@
         </p:blipFill>
         <p:spPr bwMode="auto">
           <a:xfrm>
-            <a:off x="6858000" y="4343400"/>
-            <a:ext cx="330200" cy="330200"/>
+            <a:off x="6400800" y="3200400"/>
+            <a:ext cx="384048" cy="384048"/>
           </a:xfrm>
           <a:prstGeom prst="rect">
             <a:avLst/>
@@ -4049,8 +4065,8 @@
         </p:blipFill>
         <p:spPr bwMode="auto">
           <a:xfrm>
-            <a:off x="3615665" y="5072390"/>
-            <a:ext cx="457200" cy="457200"/>
+            <a:off x="3566160" y="4114800"/>
+            <a:ext cx="466344" cy="466344"/>
           </a:xfrm>
           <a:prstGeom prst="rect">
             <a:avLst/>
@@ -4096,8 +4112,8 @@
         </p:nvSpPr>
         <p:spPr bwMode="auto">
           <a:xfrm>
-            <a:off x="3276600" y="5529590"/>
-            <a:ext cx="1115904" cy="261610"/>
+            <a:off x="3312975" y="4526280"/>
+            <a:ext cx="914400" cy="261610"/>
           </a:xfrm>
           <a:prstGeom prst="rect">
             <a:avLst/>
@@ -4268,8 +4284,8 @@
         </p:blipFill>
         <p:spPr bwMode="auto">
           <a:xfrm>
-            <a:off x="6843161" y="5072390"/>
-            <a:ext cx="457200" cy="457200"/>
+            <a:off x="6355080" y="4114800"/>
+            <a:ext cx="466344" cy="466344"/>
           </a:xfrm>
           <a:prstGeom prst="rect">
             <a:avLst/>
@@ -4315,8 +4331,8 @@
         </p:nvSpPr>
         <p:spPr bwMode="auto">
           <a:xfrm>
-            <a:off x="6504096" y="5529590"/>
-            <a:ext cx="1115904" cy="261610"/>
+            <a:off x="6144768" y="4526280"/>
+            <a:ext cx="914400" cy="261610"/>
           </a:xfrm>
           <a:prstGeom prst="rect">
             <a:avLst/>
@@ -4487,8 +4503,8 @@
         </p:blipFill>
         <p:spPr bwMode="auto">
           <a:xfrm>
-            <a:off x="10043561" y="5072390"/>
-            <a:ext cx="457200" cy="457200"/>
+            <a:off x="9144000" y="4114800"/>
+            <a:ext cx="466344" cy="466344"/>
           </a:xfrm>
           <a:prstGeom prst="rect">
             <a:avLst/>
@@ -4534,8 +4550,8 @@
         </p:nvSpPr>
         <p:spPr bwMode="auto">
           <a:xfrm>
-            <a:off x="9704496" y="5529590"/>
-            <a:ext cx="1115904" cy="261610"/>
+            <a:off x="8915400" y="4526280"/>
+            <a:ext cx="914400" cy="261610"/>
           </a:xfrm>
           <a:prstGeom prst="rect">
             <a:avLst/>
@@ -4708,8 +4724,8 @@
         </p:blipFill>
         <p:spPr bwMode="auto">
           <a:xfrm>
-            <a:off x="3563022" y="2636271"/>
-            <a:ext cx="457200" cy="457200"/>
+            <a:off x="3566160" y="2438400"/>
+            <a:ext cx="466344" cy="466344"/>
           </a:xfrm>
           <a:prstGeom prst="rect">
             <a:avLst/>
@@ -4755,8 +4771,8 @@
         </p:nvSpPr>
         <p:spPr bwMode="auto">
           <a:xfrm>
-            <a:off x="3227832" y="3091190"/>
-            <a:ext cx="1115568" cy="430887"/>
+            <a:off x="3211449" y="2880360"/>
+            <a:ext cx="1188720" cy="261610"/>
           </a:xfrm>
           <a:prstGeom prst="rect">
             <a:avLst/>
@@ -4890,18 +4906,13 @@
           <a:p>
             <a:pPr algn="ctr" eaLnBrk="1" hangingPunct="1"/>
             <a:r>
-              <a:rPr lang="en-US" altLang="en-US" sz="1100">
+              <a:rPr lang="en-US" altLang="en-US" sz="1100" dirty="0">
                 <a:latin typeface="Arial" panose="020B0604020202020204" pitchFamily="34" charset="0"/>
                 <a:ea typeface="Amazon Ember" panose="020B0603020204020204" pitchFamily="34" charset="0"/>
                 <a:cs typeface="Arial" panose="020B0604020202020204" pitchFamily="34" charset="0"/>
               </a:rPr>
-              <a:t>EC2 Primary Node</a:t>
-            </a:r>
-            <a:endParaRPr lang="en-US" altLang="en-US" sz="1100" dirty="0">
-              <a:latin typeface="Arial" panose="020B0604020202020204" pitchFamily="34" charset="0"/>
-              <a:ea typeface="Amazon Ember" panose="020B0603020204020204" pitchFamily="34" charset="0"/>
-              <a:cs typeface="Arial" panose="020B0604020202020204" pitchFamily="34" charset="0"/>
-            </a:endParaRPr>
+              <a:t>EC2 primary node</a:t>
+            </a:r>
           </a:p>
         </p:txBody>
       </p:sp>
@@ -4921,7 +4932,7 @@
         </p:nvSpPr>
         <p:spPr bwMode="auto">
           <a:xfrm>
-            <a:off x="3184834" y="2135187"/>
+            <a:off x="3182112" y="2103120"/>
             <a:ext cx="1234766" cy="261610"/>
           </a:xfrm>
           <a:prstGeom prst="rect">
@@ -5095,8 +5106,8 @@
         </p:blipFill>
         <p:spPr bwMode="auto">
           <a:xfrm>
-            <a:off x="3581090" y="1676400"/>
-            <a:ext cx="457200" cy="457200"/>
+            <a:off x="3566160" y="1676400"/>
+            <a:ext cx="466344" cy="466344"/>
           </a:xfrm>
           <a:prstGeom prst="rect">
             <a:avLst/>
@@ -5142,8 +5153,8 @@
         </p:nvSpPr>
         <p:spPr bwMode="auto">
           <a:xfrm>
-            <a:off x="6385234" y="2135187"/>
-            <a:ext cx="1234766" cy="261610"/>
+            <a:off x="6035040" y="2103120"/>
+            <a:ext cx="1097280" cy="261610"/>
           </a:xfrm>
           <a:prstGeom prst="rect">
             <a:avLst/>
@@ -5316,8 +5327,8 @@
         </p:blipFill>
         <p:spPr bwMode="auto">
           <a:xfrm>
-            <a:off x="6781490" y="1676400"/>
-            <a:ext cx="457200" cy="457200"/>
+            <a:off x="6355080" y="1676400"/>
+            <a:ext cx="466344" cy="466344"/>
           </a:xfrm>
           <a:prstGeom prst="rect">
             <a:avLst/>
@@ -5363,8 +5374,8 @@
         </p:nvSpPr>
         <p:spPr bwMode="auto">
           <a:xfrm>
-            <a:off x="9661834" y="2135187"/>
-            <a:ext cx="1234766" cy="261610"/>
+            <a:off x="8869680" y="2103120"/>
+            <a:ext cx="1097280" cy="261610"/>
           </a:xfrm>
           <a:prstGeom prst="rect">
             <a:avLst/>
@@ -5537,8 +5548,8 @@
         </p:blipFill>
         <p:spPr bwMode="auto">
           <a:xfrm>
-            <a:off x="10058090" y="1676400"/>
-            <a:ext cx="457200" cy="457200"/>
+            <a:off x="9144000" y="1676400"/>
+            <a:ext cx="466344" cy="466344"/>
           </a:xfrm>
           <a:prstGeom prst="rect">
             <a:avLst/>
@@ -5597,7 +5608,7 @@
         </p:blipFill>
         <p:spPr bwMode="auto">
           <a:xfrm>
-            <a:off x="596900" y="4940300"/>
+            <a:off x="182880" y="3931920"/>
             <a:ext cx="850900" cy="850900"/>
           </a:xfrm>
           <a:prstGeom prst="rect">
@@ -5657,7 +5668,7 @@
         </p:blipFill>
         <p:spPr bwMode="auto">
           <a:xfrm>
-            <a:off x="609600" y="2501900"/>
+            <a:off x="182880" y="2273300"/>
             <a:ext cx="850900" cy="850900"/>
           </a:xfrm>
           <a:prstGeom prst="rect">
@@ -5704,8 +5715,8 @@
         </p:nvSpPr>
         <p:spPr bwMode="auto">
           <a:xfrm>
-            <a:off x="457200" y="3429000"/>
-            <a:ext cx="1115904" cy="261610"/>
+            <a:off x="365760" y="3091190"/>
+            <a:ext cx="548640" cy="261610"/>
           </a:xfrm>
           <a:prstGeom prst="rect">
             <a:avLst/>
@@ -5839,18 +5850,13 @@
           <a:p>
             <a:pPr algn="ctr" eaLnBrk="1" hangingPunct="1"/>
             <a:r>
-              <a:rPr lang="en-US" altLang="en-US" sz="1100">
+              <a:rPr lang="en-US" altLang="en-US" sz="1100" dirty="0">
                 <a:latin typeface="Arial" panose="020B0604020202020204" pitchFamily="34" charset="0"/>
                 <a:ea typeface="Amazon Ember" panose="020B0603020204020204" pitchFamily="34" charset="0"/>
                 <a:cs typeface="Arial" panose="020B0604020202020204" pitchFamily="34" charset="0"/>
               </a:rPr>
               <a:t>Primary</a:t>
             </a:r>
-            <a:endParaRPr lang="en-US" altLang="en-US" sz="1100" dirty="0">
-              <a:latin typeface="Arial" panose="020B0604020202020204" pitchFamily="34" charset="0"/>
-              <a:ea typeface="Amazon Ember" panose="020B0603020204020204" pitchFamily="34" charset="0"/>
-              <a:cs typeface="Arial" panose="020B0604020202020204" pitchFamily="34" charset="0"/>
-            </a:endParaRPr>
           </a:p>
         </p:txBody>
       </p:sp>
@@ -5870,8 +5876,8 @@
         </p:nvSpPr>
         <p:spPr bwMode="auto">
           <a:xfrm>
-            <a:off x="457200" y="5791200"/>
-            <a:ext cx="1115904" cy="261610"/>
+            <a:off x="155448" y="4754880"/>
+            <a:ext cx="914400" cy="261610"/>
           </a:xfrm>
           <a:prstGeom prst="rect">
             <a:avLst/>
@@ -6005,18 +6011,13 @@
           <a:p>
             <a:pPr algn="ctr" eaLnBrk="1" hangingPunct="1"/>
             <a:r>
-              <a:rPr lang="en-US" altLang="en-US" sz="1100">
+              <a:rPr lang="en-US" altLang="en-US" sz="1100" dirty="0">
                 <a:latin typeface="Arial" panose="020B0604020202020204" pitchFamily="34" charset="0"/>
                 <a:ea typeface="Amazon Ember" panose="020B0603020204020204" pitchFamily="34" charset="0"/>
                 <a:cs typeface="Arial" panose="020B0604020202020204" pitchFamily="34" charset="0"/>
               </a:rPr>
               <a:t>Collaborators</a:t>
             </a:r>
-            <a:endParaRPr lang="en-US" altLang="en-US" sz="1100" dirty="0">
-              <a:latin typeface="Arial" panose="020B0604020202020204" pitchFamily="34" charset="0"/>
-              <a:ea typeface="Amazon Ember" panose="020B0603020204020204" pitchFamily="34" charset="0"/>
-              <a:cs typeface="Arial" panose="020B0604020202020204" pitchFamily="34" charset="0"/>
-            </a:endParaRPr>
           </a:p>
         </p:txBody>
       </p:sp>
@@ -6031,13 +6032,15 @@
           </p:cNvPr>
           <p:cNvCxnSpPr>
             <a:cxnSpLocks/>
+            <a:stCxn id="30" idx="3"/>
+            <a:endCxn id="21" idx="1"/>
           </p:cNvCxnSpPr>
           <p:nvPr/>
         </p:nvCxnSpPr>
         <p:spPr>
-          <a:xfrm>
-            <a:off x="1447800" y="2895600"/>
-            <a:ext cx="2057400" cy="0"/>
+          <a:xfrm flipV="1">
+            <a:off x="1033780" y="2671572"/>
+            <a:ext cx="2532380" cy="27178"/>
           </a:xfrm>
           <a:prstGeom prst="straightConnector1">
             <a:avLst/>
@@ -6076,13 +6079,15 @@
           </p:cNvPr>
           <p:cNvCxnSpPr>
             <a:cxnSpLocks/>
+            <a:stCxn id="29" idx="3"/>
+            <a:endCxn id="15" idx="1"/>
           </p:cNvCxnSpPr>
           <p:nvPr/>
         </p:nvCxnSpPr>
         <p:spPr>
-          <a:xfrm>
-            <a:off x="1447800" y="5410200"/>
-            <a:ext cx="2057400" cy="0"/>
+          <a:xfrm flipV="1">
+            <a:off x="1033780" y="4347972"/>
+            <a:ext cx="2532380" cy="9398"/>
           </a:xfrm>
           <a:prstGeom prst="straightConnector1">
             <a:avLst/>
@@ -6124,8 +6129,8 @@
         </p:nvSpPr>
         <p:spPr>
           <a:xfrm>
-            <a:off x="2246312" y="533400"/>
-            <a:ext cx="9412288" cy="5867400"/>
+            <a:off x="1737360" y="1005840"/>
+            <a:ext cx="9235440" cy="4206240"/>
           </a:xfrm>
           <a:prstGeom prst="rect">
             <a:avLst/>
@@ -6209,8 +6214,8 @@
         </p:blipFill>
         <p:spPr bwMode="auto">
           <a:xfrm>
-            <a:off x="2246313" y="533400"/>
-            <a:ext cx="330200" cy="330200"/>
+            <a:off x="1737360" y="1005840"/>
+            <a:ext cx="384048" cy="384048"/>
           </a:xfrm>
           <a:prstGeom prst="rect">
             <a:avLst/>
@@ -6254,8 +6259,8 @@
         </p:nvSpPr>
         <p:spPr>
           <a:xfrm>
-            <a:off x="2438400" y="914400"/>
-            <a:ext cx="2895600" cy="5334000"/>
+            <a:off x="2606040" y="640080"/>
+            <a:ext cx="2468880" cy="4754880"/>
           </a:xfrm>
           <a:prstGeom prst="rect">
             <a:avLst/>
@@ -6324,8 +6329,8 @@
         </p:nvSpPr>
         <p:spPr>
           <a:xfrm>
-            <a:off x="5562600" y="914400"/>
-            <a:ext cx="2895600" cy="5334000"/>
+            <a:off x="5394960" y="640080"/>
+            <a:ext cx="2468880" cy="4754880"/>
           </a:xfrm>
           <a:prstGeom prst="rect">
             <a:avLst/>
@@ -6394,8 +6399,8 @@
         </p:nvSpPr>
         <p:spPr>
           <a:xfrm>
-            <a:off x="8686800" y="914400"/>
-            <a:ext cx="2895600" cy="5334000"/>
+            <a:off x="8138160" y="640080"/>
+            <a:ext cx="2468880" cy="4754880"/>
           </a:xfrm>
           <a:prstGeom prst="rect">
             <a:avLst/>

</xml_diff>